<commit_message>
Improved comments and structure.
</commit_message>
<xml_diff>
--- a/Detemir Model Poster.pptx
+++ b/Detemir Model Poster.pptx
@@ -105,13 +105,18 @@
       </a:defRPr>
     </a:lvl9pPr>
   </p:defaultTextStyle>
+  <p:extLst>
+    <p:ext uri="{EFAFB233-063F-42B5-8137-9DF3F51BA10A}">
+      <p15:sldGuideLst xmlns:p15="http://schemas.microsoft.com/office/powerpoint/2012/main"/>
+    </p:ext>
+  </p:extLst>
 </p:presentation>
 </file>
 
 <file path=ppt/revisionInfo.xml><?xml version="1.0" encoding="utf-8"?>
 <p1510:revInfo xmlns:a="http://schemas.openxmlformats.org/drawingml/2006/main" xmlns:r="http://schemas.openxmlformats.org/officeDocument/2006/relationships" xmlns:p1510="http://schemas.microsoft.com/office/powerpoint/2015/10/main">
   <p1510:revLst>
-    <p1510:client id="{802EAEAD-9436-4E80-BF43-156889661AEB}" v="338" dt="2020-03-04T03:27:54.107"/>
+    <p1510:client id="{7529DDA3-4D47-4934-B8F1-36CFEDEEA8C4}" v="35" dt="2020-03-11T03:45:24.059"/>
   </p1510:revLst>
 </p1510:revInfo>
 </file>
@@ -1028,6 +1033,38 @@
       </pc:sldChg>
     </pc:docChg>
   </pc:docChgLst>
+  <pc:docChgLst>
+    <pc:chgData name="Alex McHugh" userId="d160712f20b5a671" providerId="LiveId" clId="{7529DDA3-4D47-4934-B8F1-36CFEDEEA8C4}"/>
+    <pc:docChg chg="modSld">
+      <pc:chgData name="Alex McHugh" userId="d160712f20b5a671" providerId="LiveId" clId="{7529DDA3-4D47-4934-B8F1-36CFEDEEA8C4}" dt="2020-03-11T03:45:28.208" v="46" actId="1076"/>
+      <pc:docMkLst>
+        <pc:docMk/>
+      </pc:docMkLst>
+      <pc:sldChg chg="addSp modSp">
+        <pc:chgData name="Alex McHugh" userId="d160712f20b5a671" providerId="LiveId" clId="{7529DDA3-4D47-4934-B8F1-36CFEDEEA8C4}" dt="2020-03-11T03:45:28.208" v="46" actId="1076"/>
+        <pc:sldMkLst>
+          <pc:docMk/>
+          <pc:sldMk cId="4230848691" sldId="257"/>
+        </pc:sldMkLst>
+        <pc:spChg chg="add mod">
+          <ac:chgData name="Alex McHugh" userId="d160712f20b5a671" providerId="LiveId" clId="{7529DDA3-4D47-4934-B8F1-36CFEDEEA8C4}" dt="2020-03-11T03:45:15.001" v="42" actId="1036"/>
+          <ac:spMkLst>
+            <pc:docMk/>
+            <pc:sldMk cId="4230848691" sldId="257"/>
+            <ac:spMk id="3" creationId="{41F3564D-C705-465E-A623-3903D9656CE2}"/>
+          </ac:spMkLst>
+        </pc:spChg>
+        <pc:spChg chg="add mod">
+          <ac:chgData name="Alex McHugh" userId="d160712f20b5a671" providerId="LiveId" clId="{7529DDA3-4D47-4934-B8F1-36CFEDEEA8C4}" dt="2020-03-11T03:45:28.208" v="46" actId="1076"/>
+          <ac:spMkLst>
+            <pc:docMk/>
+            <pc:sldMk cId="4230848691" sldId="257"/>
+            <ac:spMk id="64" creationId="{8E17F605-18C2-4FE0-8FDF-E98A06207729}"/>
+          </ac:spMkLst>
+        </pc:spChg>
+      </pc:sldChg>
+    </pc:docChg>
+  </pc:docChgLst>
 </pc:chgInfo>
 </file>
 
@@ -1162,7 +1199,7 @@
           <a:p>
             <a:fld id="{07D751A1-647E-4147-AE6F-8EE9473116B3}" type="datetimeFigureOut">
               <a:rPr lang="en-NZ" smtClean="0"/>
-              <a:t>4/03/2020</a:t>
+              <a:t>11/03/2020</a:t>
             </a:fld>
             <a:endParaRPr lang="en-NZ"/>
           </a:p>
@@ -1332,7 +1369,7 @@
           <a:p>
             <a:fld id="{07D751A1-647E-4147-AE6F-8EE9473116B3}" type="datetimeFigureOut">
               <a:rPr lang="en-NZ" smtClean="0"/>
-              <a:t>4/03/2020</a:t>
+              <a:t>11/03/2020</a:t>
             </a:fld>
             <a:endParaRPr lang="en-NZ"/>
           </a:p>
@@ -1512,7 +1549,7 @@
           <a:p>
             <a:fld id="{07D751A1-647E-4147-AE6F-8EE9473116B3}" type="datetimeFigureOut">
               <a:rPr lang="en-NZ" smtClean="0"/>
-              <a:t>4/03/2020</a:t>
+              <a:t>11/03/2020</a:t>
             </a:fld>
             <a:endParaRPr lang="en-NZ"/>
           </a:p>
@@ -1682,7 +1719,7 @@
           <a:p>
             <a:fld id="{07D751A1-647E-4147-AE6F-8EE9473116B3}" type="datetimeFigureOut">
               <a:rPr lang="en-NZ" smtClean="0"/>
-              <a:t>4/03/2020</a:t>
+              <a:t>11/03/2020</a:t>
             </a:fld>
             <a:endParaRPr lang="en-NZ"/>
           </a:p>
@@ -1926,7 +1963,7 @@
           <a:p>
             <a:fld id="{07D751A1-647E-4147-AE6F-8EE9473116B3}" type="datetimeFigureOut">
               <a:rPr lang="en-NZ" smtClean="0"/>
-              <a:t>4/03/2020</a:t>
+              <a:t>11/03/2020</a:t>
             </a:fld>
             <a:endParaRPr lang="en-NZ"/>
           </a:p>
@@ -2158,7 +2195,7 @@
           <a:p>
             <a:fld id="{07D751A1-647E-4147-AE6F-8EE9473116B3}" type="datetimeFigureOut">
               <a:rPr lang="en-NZ" smtClean="0"/>
-              <a:t>4/03/2020</a:t>
+              <a:t>11/03/2020</a:t>
             </a:fld>
             <a:endParaRPr lang="en-NZ"/>
           </a:p>
@@ -2525,7 +2562,7 @@
           <a:p>
             <a:fld id="{07D751A1-647E-4147-AE6F-8EE9473116B3}" type="datetimeFigureOut">
               <a:rPr lang="en-NZ" smtClean="0"/>
-              <a:t>4/03/2020</a:t>
+              <a:t>11/03/2020</a:t>
             </a:fld>
             <a:endParaRPr lang="en-NZ"/>
           </a:p>
@@ -2643,7 +2680,7 @@
           <a:p>
             <a:fld id="{07D751A1-647E-4147-AE6F-8EE9473116B3}" type="datetimeFigureOut">
               <a:rPr lang="en-NZ" smtClean="0"/>
-              <a:t>4/03/2020</a:t>
+              <a:t>11/03/2020</a:t>
             </a:fld>
             <a:endParaRPr lang="en-NZ"/>
           </a:p>
@@ -2738,7 +2775,7 @@
           <a:p>
             <a:fld id="{07D751A1-647E-4147-AE6F-8EE9473116B3}" type="datetimeFigureOut">
               <a:rPr lang="en-NZ" smtClean="0"/>
-              <a:t>4/03/2020</a:t>
+              <a:t>11/03/2020</a:t>
             </a:fld>
             <a:endParaRPr lang="en-NZ"/>
           </a:p>
@@ -3015,7 +3052,7 @@
           <a:p>
             <a:fld id="{07D751A1-647E-4147-AE6F-8EE9473116B3}" type="datetimeFigureOut">
               <a:rPr lang="en-NZ" smtClean="0"/>
-              <a:t>4/03/2020</a:t>
+              <a:t>11/03/2020</a:t>
             </a:fld>
             <a:endParaRPr lang="en-NZ"/>
           </a:p>
@@ -3272,7 +3309,7 @@
           <a:p>
             <a:fld id="{07D751A1-647E-4147-AE6F-8EE9473116B3}" type="datetimeFigureOut">
               <a:rPr lang="en-NZ" smtClean="0"/>
-              <a:t>4/03/2020</a:t>
+              <a:t>11/03/2020</a:t>
             </a:fld>
             <a:endParaRPr lang="en-NZ"/>
           </a:p>
@@ -3485,7 +3522,7 @@
           <a:p>
             <a:fld id="{07D751A1-647E-4147-AE6F-8EE9473116B3}" type="datetimeFigureOut">
               <a:rPr lang="en-NZ" smtClean="0"/>
-              <a:t>4/03/2020</a:t>
+              <a:t>11/03/2020</a:t>
             </a:fld>
             <a:endParaRPr lang="en-NZ"/>
           </a:p>
@@ -4220,8 +4257,8 @@
           </a:fontRef>
         </p:style>
       </p:cxnSp>
-      <mc:AlternateContent xmlns:mc="http://schemas.openxmlformats.org/markup-compatibility/2006">
-        <mc:Choice xmlns:a14="http://schemas.microsoft.com/office/drawing/2010/main" Requires="a14">
+      <mc:AlternateContent xmlns:mc="http://schemas.openxmlformats.org/markup-compatibility/2006" xmlns:a14="http://schemas.microsoft.com/office/drawing/2010/main">
+        <mc:Choice Requires="a14">
           <p:sp>
             <p:nvSpPr>
               <p:cNvPr id="41" name="Text Box 25">
@@ -4345,7 +4382,7 @@
             </p:txBody>
           </p:sp>
         </mc:Choice>
-        <mc:Fallback>
+        <mc:Fallback xmlns="">
           <p:sp>
             <p:nvSpPr>
               <p:cNvPr id="41" name="Text Box 25">
@@ -4393,8 +4430,8 @@
           </p:sp>
         </mc:Fallback>
       </mc:AlternateContent>
-      <mc:AlternateContent xmlns:mc="http://schemas.openxmlformats.org/markup-compatibility/2006">
-        <mc:Choice xmlns:a14="http://schemas.microsoft.com/office/drawing/2010/main" Requires="a14">
+      <mc:AlternateContent xmlns:mc="http://schemas.openxmlformats.org/markup-compatibility/2006" xmlns:a14="http://schemas.microsoft.com/office/drawing/2010/main">
+        <mc:Choice Requires="a14">
           <p:sp>
             <p:nvSpPr>
               <p:cNvPr id="42" name="Text Box 7">
@@ -4448,7 +4485,7 @@
                       <m:sSub>
                         <m:sSubPr>
                           <m:ctrlPr>
-                            <a:rPr lang="en-NZ" sz="1600" b="1">
+                            <a:rPr lang="en-NZ" sz="1600" b="1" i="1">
                               <a:effectLst/>
                               <a:latin typeface="Cambria Math" panose="02040503050406030204" pitchFamily="18" charset="0"/>
                               <a:ea typeface="Calibri" panose="020F0502020204030204" pitchFamily="34" charset="0"/>
@@ -4492,7 +4529,7 @@
             </p:txBody>
           </p:sp>
         </mc:Choice>
-        <mc:Fallback>
+        <mc:Fallback xmlns="">
           <p:sp>
             <p:nvSpPr>
               <p:cNvPr id="42" name="Text Box 7">
@@ -4540,8 +4577,8 @@
           </p:sp>
         </mc:Fallback>
       </mc:AlternateContent>
-      <mc:AlternateContent xmlns:mc="http://schemas.openxmlformats.org/markup-compatibility/2006">
-        <mc:Choice xmlns:a14="http://schemas.microsoft.com/office/drawing/2010/main" Requires="a14">
+      <mc:AlternateContent xmlns:mc="http://schemas.openxmlformats.org/markup-compatibility/2006" xmlns:a14="http://schemas.microsoft.com/office/drawing/2010/main">
+        <mc:Choice Requires="a14">
           <p:sp>
             <p:nvSpPr>
               <p:cNvPr id="43" name="Text Box 8">
@@ -4698,7 +4735,7 @@
             </p:txBody>
           </p:sp>
         </mc:Choice>
-        <mc:Fallback>
+        <mc:Fallback xmlns="">
           <p:sp>
             <p:nvSpPr>
               <p:cNvPr id="43" name="Text Box 8">
@@ -4746,8 +4783,8 @@
           </p:sp>
         </mc:Fallback>
       </mc:AlternateContent>
-      <mc:AlternateContent xmlns:mc="http://schemas.openxmlformats.org/markup-compatibility/2006">
-        <mc:Choice xmlns:a14="http://schemas.microsoft.com/office/drawing/2010/main" Requires="a14">
+      <mc:AlternateContent xmlns:mc="http://schemas.openxmlformats.org/markup-compatibility/2006" xmlns:a14="http://schemas.microsoft.com/office/drawing/2010/main">
+        <mc:Choice Requires="a14">
           <p:sp>
             <p:nvSpPr>
               <p:cNvPr id="46" name="Text Box 7">
@@ -4845,7 +4882,7 @@
             </p:txBody>
           </p:sp>
         </mc:Choice>
-        <mc:Fallback>
+        <mc:Fallback xmlns="">
           <p:sp>
             <p:nvSpPr>
               <p:cNvPr id="46" name="Text Box 7">
@@ -4893,8 +4930,8 @@
           </p:sp>
         </mc:Fallback>
       </mc:AlternateContent>
-      <mc:AlternateContent xmlns:mc="http://schemas.openxmlformats.org/markup-compatibility/2006">
-        <mc:Choice xmlns:a14="http://schemas.microsoft.com/office/drawing/2010/main" Requires="a14">
+      <mc:AlternateContent xmlns:mc="http://schemas.openxmlformats.org/markup-compatibility/2006" xmlns:a14="http://schemas.microsoft.com/office/drawing/2010/main">
+        <mc:Choice Requires="a14">
           <p:sp>
             <p:nvSpPr>
               <p:cNvPr id="47" name="Text Box 7">
@@ -5008,7 +5045,7 @@
             </p:txBody>
           </p:sp>
         </mc:Choice>
-        <mc:Fallback>
+        <mc:Fallback xmlns="">
           <p:sp>
             <p:nvSpPr>
               <p:cNvPr id="47" name="Text Box 7">
@@ -5056,8 +5093,8 @@
           </p:sp>
         </mc:Fallback>
       </mc:AlternateContent>
-      <mc:AlternateContent xmlns:mc="http://schemas.openxmlformats.org/markup-compatibility/2006">
-        <mc:Choice xmlns:a14="http://schemas.microsoft.com/office/drawing/2010/main" Requires="a14">
+      <mc:AlternateContent xmlns:mc="http://schemas.openxmlformats.org/markup-compatibility/2006" xmlns:a14="http://schemas.microsoft.com/office/drawing/2010/main">
+        <mc:Choice Requires="a14">
           <p:sp>
             <p:nvSpPr>
               <p:cNvPr id="49" name="Text Box 7">
@@ -5171,7 +5208,7 @@
             </p:txBody>
           </p:sp>
         </mc:Choice>
-        <mc:Fallback>
+        <mc:Fallback xmlns="">
           <p:sp>
             <p:nvSpPr>
               <p:cNvPr id="49" name="Text Box 7">
@@ -5219,8 +5256,8 @@
           </p:sp>
         </mc:Fallback>
       </mc:AlternateContent>
-      <mc:AlternateContent xmlns:mc="http://schemas.openxmlformats.org/markup-compatibility/2006">
-        <mc:Choice xmlns:a14="http://schemas.microsoft.com/office/drawing/2010/main" Requires="a14">
+      <mc:AlternateContent xmlns:mc="http://schemas.openxmlformats.org/markup-compatibility/2006" xmlns:a14="http://schemas.microsoft.com/office/drawing/2010/main">
+        <mc:Choice Requires="a14">
           <p:sp>
             <p:nvSpPr>
               <p:cNvPr id="50" name="Text Box 7">
@@ -5318,7 +5355,7 @@
             </p:txBody>
           </p:sp>
         </mc:Choice>
-        <mc:Fallback>
+        <mc:Fallback xmlns="">
           <p:sp>
             <p:nvSpPr>
               <p:cNvPr id="50" name="Text Box 7">
@@ -5366,8 +5403,8 @@
           </p:sp>
         </mc:Fallback>
       </mc:AlternateContent>
-      <mc:AlternateContent xmlns:mc="http://schemas.openxmlformats.org/markup-compatibility/2006">
-        <mc:Choice xmlns:a14="http://schemas.microsoft.com/office/drawing/2010/main" Requires="a14">
+      <mc:AlternateContent xmlns:mc="http://schemas.openxmlformats.org/markup-compatibility/2006" xmlns:a14="http://schemas.microsoft.com/office/drawing/2010/main">
+        <mc:Choice Requires="a14">
           <p:sp>
             <p:nvSpPr>
               <p:cNvPr id="51" name="Text Box 7">
@@ -5481,7 +5518,7 @@
             </p:txBody>
           </p:sp>
         </mc:Choice>
-        <mc:Fallback>
+        <mc:Fallback xmlns="">
           <p:sp>
             <p:nvSpPr>
               <p:cNvPr id="51" name="Text Box 7">
@@ -5618,8 +5655,8 @@
           </a:p>
         </p:txBody>
       </p:sp>
-      <mc:AlternateContent xmlns:mc="http://schemas.openxmlformats.org/markup-compatibility/2006">
-        <mc:Choice xmlns:a14="http://schemas.microsoft.com/office/drawing/2010/main" Requires="a14">
+      <mc:AlternateContent xmlns:mc="http://schemas.openxmlformats.org/markup-compatibility/2006" xmlns:a14="http://schemas.microsoft.com/office/drawing/2010/main">
+        <mc:Choice Requires="a14">
           <p:sp>
             <p:nvSpPr>
               <p:cNvPr id="54" name="TextBox 53">
@@ -5669,7 +5706,7 @@
             </p:txBody>
           </p:sp>
         </mc:Choice>
-        <mc:Fallback>
+        <mc:Fallback xmlns="">
           <p:sp>
             <p:nvSpPr>
               <p:cNvPr id="54" name="TextBox 53">
@@ -5714,8 +5751,8 @@
           </p:sp>
         </mc:Fallback>
       </mc:AlternateContent>
-      <mc:AlternateContent xmlns:mc="http://schemas.openxmlformats.org/markup-compatibility/2006">
-        <mc:Choice xmlns:a14="http://schemas.microsoft.com/office/drawing/2010/main" Requires="a14">
+      <mc:AlternateContent xmlns:mc="http://schemas.openxmlformats.org/markup-compatibility/2006" xmlns:a14="http://schemas.microsoft.com/office/drawing/2010/main">
+        <mc:Choice Requires="a14">
           <p:sp>
             <p:nvSpPr>
               <p:cNvPr id="56" name="TextBox 55">
@@ -5765,7 +5802,7 @@
             </p:txBody>
           </p:sp>
         </mc:Choice>
-        <mc:Fallback>
+        <mc:Fallback xmlns="">
           <p:sp>
             <p:nvSpPr>
               <p:cNvPr id="56" name="TextBox 55">
@@ -5810,8 +5847,8 @@
           </p:sp>
         </mc:Fallback>
       </mc:AlternateContent>
-      <mc:AlternateContent xmlns:mc="http://schemas.openxmlformats.org/markup-compatibility/2006">
-        <mc:Choice xmlns:a14="http://schemas.microsoft.com/office/drawing/2010/main" Requires="a14">
+      <mc:AlternateContent xmlns:mc="http://schemas.openxmlformats.org/markup-compatibility/2006" xmlns:a14="http://schemas.microsoft.com/office/drawing/2010/main">
+        <mc:Choice Requires="a14">
           <p:sp>
             <p:nvSpPr>
               <p:cNvPr id="57" name="TextBox 56">
@@ -5861,7 +5898,7 @@
             </p:txBody>
           </p:sp>
         </mc:Choice>
-        <mc:Fallback>
+        <mc:Fallback xmlns="">
           <p:sp>
             <p:nvSpPr>
               <p:cNvPr id="57" name="TextBox 56">
@@ -6149,8 +6186,8 @@
           </a:fontRef>
         </p:style>
       </p:cxnSp>
-      <mc:AlternateContent xmlns:mc="http://schemas.openxmlformats.org/markup-compatibility/2006">
-        <mc:Choice xmlns:a14="http://schemas.microsoft.com/office/drawing/2010/main" Requires="a14">
+      <mc:AlternateContent xmlns:mc="http://schemas.openxmlformats.org/markup-compatibility/2006" xmlns:a14="http://schemas.microsoft.com/office/drawing/2010/main">
+        <mc:Choice Requires="a14">
           <p:sp>
             <p:nvSpPr>
               <p:cNvPr id="76" name="Text Box 7">
@@ -6264,7 +6301,7 @@
             </p:txBody>
           </p:sp>
         </mc:Choice>
-        <mc:Fallback>
+        <mc:Fallback xmlns="">
           <p:sp>
             <p:nvSpPr>
               <p:cNvPr id="76" name="Text Box 7">
@@ -6312,8 +6349,8 @@
           </p:sp>
         </mc:Fallback>
       </mc:AlternateContent>
-      <mc:AlternateContent xmlns:mc="http://schemas.openxmlformats.org/markup-compatibility/2006">
-        <mc:Choice xmlns:a14="http://schemas.microsoft.com/office/drawing/2010/main" Requires="a14">
+      <mc:AlternateContent xmlns:mc="http://schemas.openxmlformats.org/markup-compatibility/2006" xmlns:a14="http://schemas.microsoft.com/office/drawing/2010/main">
+        <mc:Choice Requires="a14">
           <p:sp>
             <p:nvSpPr>
               <p:cNvPr id="77" name="Text Box 7">
@@ -6427,7 +6464,7 @@
             </p:txBody>
           </p:sp>
         </mc:Choice>
-        <mc:Fallback>
+        <mc:Fallback xmlns="">
           <p:sp>
             <p:nvSpPr>
               <p:cNvPr id="77" name="Text Box 7">
@@ -6519,8 +6556,8 @@
           </a:fontRef>
         </p:style>
       </p:cxnSp>
-      <mc:AlternateContent xmlns:mc="http://schemas.openxmlformats.org/markup-compatibility/2006">
-        <mc:Choice xmlns:a14="http://schemas.microsoft.com/office/drawing/2010/main" Requires="a14">
+      <mc:AlternateContent xmlns:mc="http://schemas.openxmlformats.org/markup-compatibility/2006" xmlns:a14="http://schemas.microsoft.com/office/drawing/2010/main">
+        <mc:Choice Requires="a14">
           <p:sp>
             <p:nvSpPr>
               <p:cNvPr id="84" name="Text Box 7">
@@ -6677,7 +6714,7 @@
             </p:txBody>
           </p:sp>
         </mc:Choice>
-        <mc:Fallback>
+        <mc:Fallback xmlns="">
           <p:sp>
             <p:nvSpPr>
               <p:cNvPr id="84" name="Text Box 7">
@@ -6725,8 +6762,8 @@
           </p:sp>
         </mc:Fallback>
       </mc:AlternateContent>
-      <mc:AlternateContent xmlns:mc="http://schemas.openxmlformats.org/markup-compatibility/2006">
-        <mc:Choice xmlns:a14="http://schemas.microsoft.com/office/drawing/2010/main" Requires="a14">
+      <mc:AlternateContent xmlns:mc="http://schemas.openxmlformats.org/markup-compatibility/2006" xmlns:a14="http://schemas.microsoft.com/office/drawing/2010/main">
+        <mc:Choice Requires="a14">
           <p:sp>
             <p:nvSpPr>
               <p:cNvPr id="86" name="Text Box 7">
@@ -6816,7 +6853,7 @@
             </p:txBody>
           </p:sp>
         </mc:Choice>
-        <mc:Fallback>
+        <mc:Fallback xmlns="">
           <p:sp>
             <p:nvSpPr>
               <p:cNvPr id="86" name="Text Box 7">
@@ -6864,8 +6901,8 @@
           </p:sp>
         </mc:Fallback>
       </mc:AlternateContent>
-      <mc:AlternateContent xmlns:mc="http://schemas.openxmlformats.org/markup-compatibility/2006">
-        <mc:Choice xmlns:a14="http://schemas.microsoft.com/office/drawing/2010/main" Requires="a14">
+      <mc:AlternateContent xmlns:mc="http://schemas.openxmlformats.org/markup-compatibility/2006" xmlns:a14="http://schemas.microsoft.com/office/drawing/2010/main">
+        <mc:Choice Requires="a14">
           <p:sp>
             <p:nvSpPr>
               <p:cNvPr id="90" name="Text Box 7">
@@ -6968,7 +7005,7 @@
             </p:txBody>
           </p:sp>
         </mc:Choice>
-        <mc:Fallback>
+        <mc:Fallback xmlns="">
           <p:sp>
             <p:nvSpPr>
               <p:cNvPr id="90" name="Text Box 7">
@@ -7016,8 +7053,8 @@
           </p:sp>
         </mc:Fallback>
       </mc:AlternateContent>
-      <mc:AlternateContent xmlns:mc="http://schemas.openxmlformats.org/markup-compatibility/2006">
-        <mc:Choice xmlns:a14="http://schemas.microsoft.com/office/drawing/2010/main" Requires="a14">
+      <mc:AlternateContent xmlns:mc="http://schemas.openxmlformats.org/markup-compatibility/2006" xmlns:a14="http://schemas.microsoft.com/office/drawing/2010/main">
+        <mc:Choice Requires="a14">
           <p:sp>
             <p:nvSpPr>
               <p:cNvPr id="91" name="Text Box 7">
@@ -7158,7 +7195,7 @@
             </p:txBody>
           </p:sp>
         </mc:Choice>
-        <mc:Fallback>
+        <mc:Fallback xmlns="">
           <p:sp>
             <p:nvSpPr>
               <p:cNvPr id="91" name="Text Box 7">
@@ -7401,8 +7438,8 @@
           </p:txBody>
         </p:sp>
       </p:grpSp>
-      <mc:AlternateContent xmlns:mc="http://schemas.openxmlformats.org/markup-compatibility/2006">
-        <mc:Choice xmlns:a14="http://schemas.microsoft.com/office/drawing/2010/main" Requires="a14">
+      <mc:AlternateContent xmlns:mc="http://schemas.openxmlformats.org/markup-compatibility/2006" xmlns:a14="http://schemas.microsoft.com/office/drawing/2010/main">
+        <mc:Choice Requires="a14">
           <p:sp>
             <p:nvSpPr>
               <p:cNvPr id="105" name="Text Box 7">
@@ -7514,7 +7551,7 @@
             </p:txBody>
           </p:sp>
         </mc:Choice>
-        <mc:Fallback>
+        <mc:Fallback xmlns="">
           <p:sp>
             <p:nvSpPr>
               <p:cNvPr id="105" name="Text Box 7">
@@ -8550,8 +8587,8 @@
           </a:p>
         </p:txBody>
       </p:sp>
-      <mc:AlternateContent xmlns:mc="http://schemas.openxmlformats.org/markup-compatibility/2006">
-        <mc:Choice xmlns:a14="http://schemas.microsoft.com/office/drawing/2010/main" Requires="a14">
+      <mc:AlternateContent xmlns:mc="http://schemas.openxmlformats.org/markup-compatibility/2006" xmlns:a14="http://schemas.microsoft.com/office/drawing/2010/main">
+        <mc:Choice Requires="a14">
           <p:sp>
             <p:nvSpPr>
               <p:cNvPr id="140" name="Text Box 7">
@@ -8605,7 +8642,7 @@
                       <m:sSub>
                         <m:sSubPr>
                           <m:ctrlPr>
-                            <a:rPr lang="en-NZ" sz="1600" b="1" smtClean="0">
+                            <a:rPr lang="en-NZ" sz="1600" b="1" i="1" smtClean="0">
                               <a:effectLst/>
                               <a:latin typeface="Cambria Math" panose="02040503050406030204" pitchFamily="18" charset="0"/>
                               <a:ea typeface="Calibri" panose="020F0502020204030204" pitchFamily="34" charset="0"/>
@@ -8649,7 +8686,7 @@
             </p:txBody>
           </p:sp>
         </mc:Choice>
-        <mc:Fallback>
+        <mc:Fallback xmlns="">
           <p:sp>
             <p:nvSpPr>
               <p:cNvPr id="140" name="Text Box 7">
@@ -8697,8 +8734,8 @@
           </p:sp>
         </mc:Fallback>
       </mc:AlternateContent>
-      <mc:AlternateContent xmlns:mc="http://schemas.openxmlformats.org/markup-compatibility/2006">
-        <mc:Choice xmlns:a14="http://schemas.microsoft.com/office/drawing/2010/main" Requires="a14">
+      <mc:AlternateContent xmlns:mc="http://schemas.openxmlformats.org/markup-compatibility/2006" xmlns:a14="http://schemas.microsoft.com/office/drawing/2010/main">
+        <mc:Choice Requires="a14">
           <p:sp>
             <p:nvSpPr>
               <p:cNvPr id="141" name="Text Box 7">
@@ -8752,7 +8789,7 @@
                       <m:sSub>
                         <m:sSubPr>
                           <m:ctrlPr>
-                            <a:rPr lang="en-NZ" sz="1600" b="1" smtClean="0">
+                            <a:rPr lang="en-NZ" sz="1600" b="1" i="1" smtClean="0">
                               <a:effectLst/>
                               <a:latin typeface="Cambria Math" panose="02040503050406030204" pitchFamily="18" charset="0"/>
                               <a:ea typeface="Calibri" panose="020F0502020204030204" pitchFamily="34" charset="0"/>
@@ -8796,7 +8833,7 @@
             </p:txBody>
           </p:sp>
         </mc:Choice>
-        <mc:Fallback>
+        <mc:Fallback xmlns="">
           <p:sp>
             <p:nvSpPr>
               <p:cNvPr id="141" name="Text Box 7">
@@ -9209,8 +9246,8 @@
           </a:fontRef>
         </p:style>
       </p:cxnSp>
-      <mc:AlternateContent xmlns:mc="http://schemas.openxmlformats.org/markup-compatibility/2006">
-        <mc:Choice xmlns:a14="http://schemas.microsoft.com/office/drawing/2010/main" Requires="a14">
+      <mc:AlternateContent xmlns:mc="http://schemas.openxmlformats.org/markup-compatibility/2006" xmlns:a14="http://schemas.microsoft.com/office/drawing/2010/main">
+        <mc:Choice Requires="a14">
           <p:sp>
             <p:nvSpPr>
               <p:cNvPr id="41" name="Text Box 25">
@@ -9334,7 +9371,7 @@
             </p:txBody>
           </p:sp>
         </mc:Choice>
-        <mc:Fallback>
+        <mc:Fallback xmlns="">
           <p:sp>
             <p:nvSpPr>
               <p:cNvPr id="41" name="Text Box 25">
@@ -9382,8 +9419,8 @@
           </p:sp>
         </mc:Fallback>
       </mc:AlternateContent>
-      <mc:AlternateContent xmlns:mc="http://schemas.openxmlformats.org/markup-compatibility/2006">
-        <mc:Choice xmlns:a14="http://schemas.microsoft.com/office/drawing/2010/main" Requires="a14">
+      <mc:AlternateContent xmlns:mc="http://schemas.openxmlformats.org/markup-compatibility/2006" xmlns:a14="http://schemas.microsoft.com/office/drawing/2010/main">
+        <mc:Choice Requires="a14">
           <p:sp>
             <p:nvSpPr>
               <p:cNvPr id="46" name="Text Box 7">
@@ -9481,7 +9518,7 @@
             </p:txBody>
           </p:sp>
         </mc:Choice>
-        <mc:Fallback>
+        <mc:Fallback xmlns="">
           <p:sp>
             <p:nvSpPr>
               <p:cNvPr id="46" name="Text Box 7">
@@ -9529,8 +9566,8 @@
           </p:sp>
         </mc:Fallback>
       </mc:AlternateContent>
-      <mc:AlternateContent xmlns:mc="http://schemas.openxmlformats.org/markup-compatibility/2006">
-        <mc:Choice xmlns:a14="http://schemas.microsoft.com/office/drawing/2010/main" Requires="a14">
+      <mc:AlternateContent xmlns:mc="http://schemas.openxmlformats.org/markup-compatibility/2006" xmlns:a14="http://schemas.microsoft.com/office/drawing/2010/main">
+        <mc:Choice Requires="a14">
           <p:sp>
             <p:nvSpPr>
               <p:cNvPr id="47" name="Text Box 7">
@@ -9644,7 +9681,7 @@
             </p:txBody>
           </p:sp>
         </mc:Choice>
-        <mc:Fallback>
+        <mc:Fallback xmlns="">
           <p:sp>
             <p:nvSpPr>
               <p:cNvPr id="47" name="Text Box 7">
@@ -9692,8 +9729,8 @@
           </p:sp>
         </mc:Fallback>
       </mc:AlternateContent>
-      <mc:AlternateContent xmlns:mc="http://schemas.openxmlformats.org/markup-compatibility/2006">
-        <mc:Choice xmlns:a14="http://schemas.microsoft.com/office/drawing/2010/main" Requires="a14">
+      <mc:AlternateContent xmlns:mc="http://schemas.openxmlformats.org/markup-compatibility/2006" xmlns:a14="http://schemas.microsoft.com/office/drawing/2010/main">
+        <mc:Choice Requires="a14">
           <p:sp>
             <p:nvSpPr>
               <p:cNvPr id="49" name="Text Box 7">
@@ -9807,7 +9844,7 @@
             </p:txBody>
           </p:sp>
         </mc:Choice>
-        <mc:Fallback>
+        <mc:Fallback xmlns="">
           <p:sp>
             <p:nvSpPr>
               <p:cNvPr id="49" name="Text Box 7">
@@ -9855,8 +9892,8 @@
           </p:sp>
         </mc:Fallback>
       </mc:AlternateContent>
-      <mc:AlternateContent xmlns:mc="http://schemas.openxmlformats.org/markup-compatibility/2006">
-        <mc:Choice xmlns:a14="http://schemas.microsoft.com/office/drawing/2010/main" Requires="a14">
+      <mc:AlternateContent xmlns:mc="http://schemas.openxmlformats.org/markup-compatibility/2006" xmlns:a14="http://schemas.microsoft.com/office/drawing/2010/main">
+        <mc:Choice Requires="a14">
           <p:sp>
             <p:nvSpPr>
               <p:cNvPr id="50" name="Text Box 7">
@@ -9954,7 +9991,7 @@
             </p:txBody>
           </p:sp>
         </mc:Choice>
-        <mc:Fallback>
+        <mc:Fallback xmlns="">
           <p:sp>
             <p:nvSpPr>
               <p:cNvPr id="50" name="Text Box 7">
@@ -10002,8 +10039,8 @@
           </p:sp>
         </mc:Fallback>
       </mc:AlternateContent>
-      <mc:AlternateContent xmlns:mc="http://schemas.openxmlformats.org/markup-compatibility/2006">
-        <mc:Choice xmlns:a14="http://schemas.microsoft.com/office/drawing/2010/main" Requires="a14">
+      <mc:AlternateContent xmlns:mc="http://schemas.openxmlformats.org/markup-compatibility/2006" xmlns:a14="http://schemas.microsoft.com/office/drawing/2010/main">
+        <mc:Choice Requires="a14">
           <p:sp>
             <p:nvSpPr>
               <p:cNvPr id="51" name="Text Box 7">
@@ -10117,7 +10154,7 @@
             </p:txBody>
           </p:sp>
         </mc:Choice>
-        <mc:Fallback>
+        <mc:Fallback xmlns="">
           <p:sp>
             <p:nvSpPr>
               <p:cNvPr id="51" name="Text Box 7">
@@ -10254,8 +10291,8 @@
           </a:p>
         </p:txBody>
       </p:sp>
-      <mc:AlternateContent xmlns:mc="http://schemas.openxmlformats.org/markup-compatibility/2006">
-        <mc:Choice xmlns:a14="http://schemas.microsoft.com/office/drawing/2010/main" Requires="a14">
+      <mc:AlternateContent xmlns:mc="http://schemas.openxmlformats.org/markup-compatibility/2006" xmlns:a14="http://schemas.microsoft.com/office/drawing/2010/main">
+        <mc:Choice Requires="a14">
           <p:sp>
             <p:nvSpPr>
               <p:cNvPr id="54" name="TextBox 53">
@@ -10305,7 +10342,7 @@
             </p:txBody>
           </p:sp>
         </mc:Choice>
-        <mc:Fallback>
+        <mc:Fallback xmlns="">
           <p:sp>
             <p:nvSpPr>
               <p:cNvPr id="54" name="TextBox 53">
@@ -10350,8 +10387,8 @@
           </p:sp>
         </mc:Fallback>
       </mc:AlternateContent>
-      <mc:AlternateContent xmlns:mc="http://schemas.openxmlformats.org/markup-compatibility/2006">
-        <mc:Choice xmlns:a14="http://schemas.microsoft.com/office/drawing/2010/main" Requires="a14">
+      <mc:AlternateContent xmlns:mc="http://schemas.openxmlformats.org/markup-compatibility/2006" xmlns:a14="http://schemas.microsoft.com/office/drawing/2010/main">
+        <mc:Choice Requires="a14">
           <p:sp>
             <p:nvSpPr>
               <p:cNvPr id="56" name="TextBox 55">
@@ -10401,7 +10438,7 @@
             </p:txBody>
           </p:sp>
         </mc:Choice>
-        <mc:Fallback>
+        <mc:Fallback xmlns="">
           <p:sp>
             <p:nvSpPr>
               <p:cNvPr id="56" name="TextBox 55">
@@ -10446,8 +10483,8 @@
           </p:sp>
         </mc:Fallback>
       </mc:AlternateContent>
-      <mc:AlternateContent xmlns:mc="http://schemas.openxmlformats.org/markup-compatibility/2006">
-        <mc:Choice xmlns:a14="http://schemas.microsoft.com/office/drawing/2010/main" Requires="a14">
+      <mc:AlternateContent xmlns:mc="http://schemas.openxmlformats.org/markup-compatibility/2006" xmlns:a14="http://schemas.microsoft.com/office/drawing/2010/main">
+        <mc:Choice Requires="a14">
           <p:sp>
             <p:nvSpPr>
               <p:cNvPr id="57" name="TextBox 56">
@@ -10497,7 +10534,7 @@
             </p:txBody>
           </p:sp>
         </mc:Choice>
-        <mc:Fallback>
+        <mc:Fallback xmlns="">
           <p:sp>
             <p:nvSpPr>
               <p:cNvPr id="57" name="TextBox 56">
@@ -10785,8 +10822,8 @@
           </a:fontRef>
         </p:style>
       </p:cxnSp>
-      <mc:AlternateContent xmlns:mc="http://schemas.openxmlformats.org/markup-compatibility/2006">
-        <mc:Choice xmlns:a14="http://schemas.microsoft.com/office/drawing/2010/main" Requires="a14">
+      <mc:AlternateContent xmlns:mc="http://schemas.openxmlformats.org/markup-compatibility/2006" xmlns:a14="http://schemas.microsoft.com/office/drawing/2010/main">
+        <mc:Choice Requires="a14">
           <p:sp>
             <p:nvSpPr>
               <p:cNvPr id="76" name="Text Box 7">
@@ -10900,7 +10937,7 @@
             </p:txBody>
           </p:sp>
         </mc:Choice>
-        <mc:Fallback>
+        <mc:Fallback xmlns="">
           <p:sp>
             <p:nvSpPr>
               <p:cNvPr id="76" name="Text Box 7">
@@ -10948,8 +10985,8 @@
           </p:sp>
         </mc:Fallback>
       </mc:AlternateContent>
-      <mc:AlternateContent xmlns:mc="http://schemas.openxmlformats.org/markup-compatibility/2006">
-        <mc:Choice xmlns:a14="http://schemas.microsoft.com/office/drawing/2010/main" Requires="a14">
+      <mc:AlternateContent xmlns:mc="http://schemas.openxmlformats.org/markup-compatibility/2006" xmlns:a14="http://schemas.microsoft.com/office/drawing/2010/main">
+        <mc:Choice Requires="a14">
           <p:sp>
             <p:nvSpPr>
               <p:cNvPr id="77" name="Text Box 7">
@@ -11063,7 +11100,7 @@
             </p:txBody>
           </p:sp>
         </mc:Choice>
-        <mc:Fallback>
+        <mc:Fallback xmlns="">
           <p:sp>
             <p:nvSpPr>
               <p:cNvPr id="77" name="Text Box 7">
@@ -11155,8 +11192,8 @@
           </a:fontRef>
         </p:style>
       </p:cxnSp>
-      <mc:AlternateContent xmlns:mc="http://schemas.openxmlformats.org/markup-compatibility/2006">
-        <mc:Choice xmlns:a14="http://schemas.microsoft.com/office/drawing/2010/main" Requires="a14">
+      <mc:AlternateContent xmlns:mc="http://schemas.openxmlformats.org/markup-compatibility/2006" xmlns:a14="http://schemas.microsoft.com/office/drawing/2010/main">
+        <mc:Choice Requires="a14">
           <p:sp>
             <p:nvSpPr>
               <p:cNvPr id="84" name="Text Box 7">
@@ -11313,7 +11350,7 @@
             </p:txBody>
           </p:sp>
         </mc:Choice>
-        <mc:Fallback>
+        <mc:Fallback xmlns="">
           <p:sp>
             <p:nvSpPr>
               <p:cNvPr id="84" name="Text Box 7">
@@ -11361,8 +11398,8 @@
           </p:sp>
         </mc:Fallback>
       </mc:AlternateContent>
-      <mc:AlternateContent xmlns:mc="http://schemas.openxmlformats.org/markup-compatibility/2006">
-        <mc:Choice xmlns:a14="http://schemas.microsoft.com/office/drawing/2010/main" Requires="a14">
+      <mc:AlternateContent xmlns:mc="http://schemas.openxmlformats.org/markup-compatibility/2006" xmlns:a14="http://schemas.microsoft.com/office/drawing/2010/main">
+        <mc:Choice Requires="a14">
           <p:sp>
             <p:nvSpPr>
               <p:cNvPr id="86" name="Text Box 7">
@@ -11452,7 +11489,7 @@
             </p:txBody>
           </p:sp>
         </mc:Choice>
-        <mc:Fallback>
+        <mc:Fallback xmlns="">
           <p:sp>
             <p:nvSpPr>
               <p:cNvPr id="86" name="Text Box 7">
@@ -11500,8 +11537,8 @@
           </p:sp>
         </mc:Fallback>
       </mc:AlternateContent>
-      <mc:AlternateContent xmlns:mc="http://schemas.openxmlformats.org/markup-compatibility/2006">
-        <mc:Choice xmlns:a14="http://schemas.microsoft.com/office/drawing/2010/main" Requires="a14">
+      <mc:AlternateContent xmlns:mc="http://schemas.openxmlformats.org/markup-compatibility/2006" xmlns:a14="http://schemas.microsoft.com/office/drawing/2010/main">
+        <mc:Choice Requires="a14">
           <p:sp>
             <p:nvSpPr>
               <p:cNvPr id="90" name="Text Box 7">
@@ -11604,7 +11641,7 @@
             </p:txBody>
           </p:sp>
         </mc:Choice>
-        <mc:Fallback>
+        <mc:Fallback xmlns="">
           <p:sp>
             <p:nvSpPr>
               <p:cNvPr id="90" name="Text Box 7">
@@ -11652,8 +11689,8 @@
           </p:sp>
         </mc:Fallback>
       </mc:AlternateContent>
-      <mc:AlternateContent xmlns:mc="http://schemas.openxmlformats.org/markup-compatibility/2006">
-        <mc:Choice xmlns:a14="http://schemas.microsoft.com/office/drawing/2010/main" Requires="a14">
+      <mc:AlternateContent xmlns:mc="http://schemas.openxmlformats.org/markup-compatibility/2006" xmlns:a14="http://schemas.microsoft.com/office/drawing/2010/main">
+        <mc:Choice Requires="a14">
           <p:sp>
             <p:nvSpPr>
               <p:cNvPr id="91" name="Text Box 7">
@@ -11794,7 +11831,7 @@
             </p:txBody>
           </p:sp>
         </mc:Choice>
-        <mc:Fallback>
+        <mc:Fallback xmlns="">
           <p:sp>
             <p:nvSpPr>
               <p:cNvPr id="91" name="Text Box 7">
@@ -12037,8 +12074,8 @@
           </p:txBody>
         </p:sp>
       </p:grpSp>
-      <mc:AlternateContent xmlns:mc="http://schemas.openxmlformats.org/markup-compatibility/2006">
-        <mc:Choice xmlns:a14="http://schemas.microsoft.com/office/drawing/2010/main" Requires="a14">
+      <mc:AlternateContent xmlns:mc="http://schemas.openxmlformats.org/markup-compatibility/2006" xmlns:a14="http://schemas.microsoft.com/office/drawing/2010/main">
+        <mc:Choice Requires="a14">
           <p:sp>
             <p:nvSpPr>
               <p:cNvPr id="105" name="Text Box 7">
@@ -12150,7 +12187,7 @@
             </p:txBody>
           </p:sp>
         </mc:Choice>
-        <mc:Fallback>
+        <mc:Fallback xmlns="">
           <p:sp>
             <p:nvSpPr>
               <p:cNvPr id="105" name="Text Box 7">
@@ -13285,8 +13322,8 @@
           </a:p>
         </p:txBody>
       </p:sp>
-      <mc:AlternateContent xmlns:mc="http://schemas.openxmlformats.org/markup-compatibility/2006">
-        <mc:Choice xmlns:a14="http://schemas.microsoft.com/office/drawing/2010/main" Requires="a14">
+      <mc:AlternateContent xmlns:mc="http://schemas.openxmlformats.org/markup-compatibility/2006" xmlns:a14="http://schemas.microsoft.com/office/drawing/2010/main">
+        <mc:Choice Requires="a14">
           <p:sp>
             <p:nvSpPr>
               <p:cNvPr id="140" name="Text Box 7">
@@ -13350,7 +13387,7 @@
                       <m:sSub>
                         <m:sSubPr>
                           <m:ctrlPr>
-                            <a:rPr lang="en-NZ" sz="1600" b="1" smtClean="0">
+                            <a:rPr lang="en-NZ" sz="1600" b="1" i="1" smtClean="0">
                               <a:latin typeface="Cambria Math" panose="02040503050406030204" pitchFamily="18" charset="0"/>
                               <a:ea typeface="Cambria Math" panose="02040503050406030204" pitchFamily="18" charset="0"/>
                             </a:rPr>
@@ -13388,7 +13425,7 @@
             </p:txBody>
           </p:sp>
         </mc:Choice>
-        <mc:Fallback>
+        <mc:Fallback xmlns="">
           <p:sp>
             <p:nvSpPr>
               <p:cNvPr id="140" name="Text Box 7">
@@ -13577,8 +13614,8 @@
           </p:txBody>
         </p:sp>
       </p:grpSp>
-      <mc:AlternateContent xmlns:mc="http://schemas.openxmlformats.org/markup-compatibility/2006">
-        <mc:Choice xmlns:a14="http://schemas.microsoft.com/office/drawing/2010/main" Requires="a14">
+      <mc:AlternateContent xmlns:mc="http://schemas.openxmlformats.org/markup-compatibility/2006" xmlns:a14="http://schemas.microsoft.com/office/drawing/2010/main">
+        <mc:Choice Requires="a14">
           <p:sp>
             <p:nvSpPr>
               <p:cNvPr id="65" name="Text Box 7">
@@ -13642,7 +13679,7 @@
                       <m:sSub>
                         <m:sSubPr>
                           <m:ctrlPr>
-                            <a:rPr lang="en-NZ" sz="1600" b="1" smtClean="0">
+                            <a:rPr lang="en-NZ" sz="1600" b="1" i="1" smtClean="0">
                               <a:latin typeface="Cambria Math" panose="02040503050406030204" pitchFamily="18" charset="0"/>
                               <a:ea typeface="Cambria Math" panose="02040503050406030204" pitchFamily="18" charset="0"/>
                             </a:rPr>
@@ -13680,7 +13717,7 @@
             </p:txBody>
           </p:sp>
         </mc:Choice>
-        <mc:Fallback>
+        <mc:Fallback xmlns="">
           <p:sp>
             <p:nvSpPr>
               <p:cNvPr id="65" name="Text Box 7">
@@ -13787,6 +13824,244 @@
           </a:prstGeom>
         </p:spPr>
       </p:pic>
+      <mc:AlternateContent xmlns:mc="http://schemas.openxmlformats.org/markup-compatibility/2006">
+        <mc:Choice xmlns:a14="http://schemas.microsoft.com/office/drawing/2010/main" Requires="a14">
+          <p:sp>
+            <p:nvSpPr>
+              <p:cNvPr id="3" name="TextBox 2">
+                <a:extLst>
+                  <a:ext uri="{FF2B5EF4-FFF2-40B4-BE49-F238E27FC236}">
+                    <a16:creationId xmlns:a16="http://schemas.microsoft.com/office/drawing/2014/main" id="{41F3564D-C705-465E-A623-3903D9656CE2}"/>
+                  </a:ext>
+                </a:extLst>
+              </p:cNvPr>
+              <p:cNvSpPr txBox="1"/>
+              <p:nvPr/>
+            </p:nvSpPr>
+            <p:spPr>
+              <a:xfrm>
+                <a:off x="1849714" y="8396071"/>
+                <a:ext cx="469920" cy="169277"/>
+              </a:xfrm>
+              <a:prstGeom prst="rect">
+                <a:avLst/>
+              </a:prstGeom>
+              <a:solidFill>
+                <a:schemeClr val="bg1"/>
+              </a:solidFill>
+            </p:spPr>
+            <p:txBody>
+              <a:bodyPr wrap="square" lIns="0" tIns="0" rIns="0" bIns="0" rtlCol="0">
+                <a:spAutoFit/>
+              </a:bodyPr>
+              <a:lstStyle/>
+              <a:p>
+                <a:pPr/>
+                <a14:m>
+                  <m:oMathPara xmlns:m="http://schemas.openxmlformats.org/officeDocument/2006/math">
+                    <m:oMathParaPr>
+                      <m:jc m:val="center"/>
+                    </m:oMathParaPr>
+                    <m:oMath xmlns:m="http://schemas.openxmlformats.org/officeDocument/2006/math">
+                      <m:r>
+                        <a:rPr lang="en-NZ" sz="1100" b="1" i="1" smtClean="0">
+                          <a:latin typeface="Cambria Math" panose="02040503050406030204" pitchFamily="18" charset="0"/>
+                          <a:ea typeface="Cambria Math" panose="02040503050406030204" pitchFamily="18" charset="0"/>
+                        </a:rPr>
+                        <m:t>𝟏</m:t>
+                      </m:r>
+                      <m:r>
+                        <a:rPr lang="en-NZ" sz="1100" b="1" i="1" smtClean="0">
+                          <a:latin typeface="Cambria Math" panose="02040503050406030204" pitchFamily="18" charset="0"/>
+                          <a:ea typeface="Cambria Math" panose="02040503050406030204" pitchFamily="18" charset="0"/>
+                        </a:rPr>
+                        <m:t>+</m:t>
+                      </m:r>
+                      <m:sSub>
+                        <m:sSubPr>
+                          <m:ctrlPr>
+                            <a:rPr lang="en-NZ" sz="1100" b="1" i="1" smtClean="0">
+                              <a:latin typeface="Cambria Math" panose="02040503050406030204" pitchFamily="18" charset="0"/>
+                              <a:ea typeface="Cambria Math" panose="02040503050406030204" pitchFamily="18" charset="0"/>
+                            </a:rPr>
+                          </m:ctrlPr>
+                        </m:sSubPr>
+                        <m:e>
+                          <m:r>
+                            <a:rPr lang="en-NZ" sz="1100" b="1" i="1" smtClean="0">
+                              <a:latin typeface="Cambria Math" panose="02040503050406030204" pitchFamily="18" charset="0"/>
+                              <a:ea typeface="Cambria Math" panose="02040503050406030204" pitchFamily="18" charset="0"/>
+                            </a:rPr>
+                            <m:t>𝜶</m:t>
+                          </m:r>
+                        </m:e>
+                        <m:sub>
+                          <m:r>
+                            <a:rPr lang="en-NZ" sz="1100" b="1" i="1" smtClean="0">
+                              <a:latin typeface="Cambria Math" panose="02040503050406030204" pitchFamily="18" charset="0"/>
+                              <a:ea typeface="Cambria Math" panose="02040503050406030204" pitchFamily="18" charset="0"/>
+                            </a:rPr>
+                            <m:t>𝑰</m:t>
+                          </m:r>
+                        </m:sub>
+                      </m:sSub>
+                      <m:r>
+                        <a:rPr lang="en-NZ" sz="1100" b="1" i="1" smtClean="0">
+                          <a:latin typeface="Cambria Math" panose="02040503050406030204" pitchFamily="18" charset="0"/>
+                        </a:rPr>
+                        <m:t>𝑰</m:t>
+                      </m:r>
+                    </m:oMath>
+                  </m:oMathPara>
+                </a14:m>
+                <a:endParaRPr lang="en-NZ" sz="1100" b="1" dirty="0"/>
+              </a:p>
+            </p:txBody>
+          </p:sp>
+        </mc:Choice>
+        <mc:Fallback>
+          <p:sp>
+            <p:nvSpPr>
+              <p:cNvPr id="3" name="TextBox 2">
+                <a:extLst>
+                  <a:ext uri="{FF2B5EF4-FFF2-40B4-BE49-F238E27FC236}">
+                    <a16:creationId xmlns:a16="http://schemas.microsoft.com/office/drawing/2014/main" id="{41F3564D-C705-465E-A623-3903D9656CE2}"/>
+                  </a:ext>
+                </a:extLst>
+              </p:cNvPr>
+              <p:cNvSpPr txBox="1">
+                <a:spLocks noRot="1" noChangeAspect="1" noMove="1" noResize="1" noEditPoints="1" noAdjustHandles="1" noChangeArrowheads="1" noChangeShapeType="1" noTextEdit="1"/>
+              </p:cNvSpPr>
+              <p:nvPr/>
+            </p:nvSpPr>
+            <p:spPr>
+              <a:xfrm>
+                <a:off x="1849714" y="8396071"/>
+                <a:ext cx="469920" cy="169277"/>
+              </a:xfrm>
+              <a:prstGeom prst="rect">
+                <a:avLst/>
+              </a:prstGeom>
+              <a:blipFill>
+                <a:blip r:embed="rId28"/>
+                <a:stretch>
+                  <a:fillRect l="-8974" r="-7692" b="-17857"/>
+                </a:stretch>
+              </a:blipFill>
+            </p:spPr>
+            <p:txBody>
+              <a:bodyPr/>
+              <a:lstStyle/>
+              <a:p>
+                <a:r>
+                  <a:rPr lang="en-NZ">
+                    <a:noFill/>
+                  </a:rPr>
+                  <a:t> </a:t>
+                </a:r>
+              </a:p>
+            </p:txBody>
+          </p:sp>
+        </mc:Fallback>
+      </mc:AlternateContent>
+      <mc:AlternateContent xmlns:mc="http://schemas.openxmlformats.org/markup-compatibility/2006">
+        <mc:Choice xmlns:a14="http://schemas.microsoft.com/office/drawing/2010/main" Requires="a14">
+          <p:sp>
+            <p:nvSpPr>
+              <p:cNvPr id="64" name="TextBox 63">
+                <a:extLst>
+                  <a:ext uri="{FF2B5EF4-FFF2-40B4-BE49-F238E27FC236}">
+                    <a16:creationId xmlns:a16="http://schemas.microsoft.com/office/drawing/2014/main" id="{8E17F605-18C2-4FE0-8FDF-E98A06207729}"/>
+                  </a:ext>
+                </a:extLst>
+              </p:cNvPr>
+              <p:cNvSpPr txBox="1"/>
+              <p:nvPr/>
+            </p:nvSpPr>
+            <p:spPr>
+              <a:xfrm>
+                <a:off x="1849714" y="8165070"/>
+                <a:ext cx="469920" cy="169277"/>
+              </a:xfrm>
+              <a:prstGeom prst="rect">
+                <a:avLst/>
+              </a:prstGeom>
+              <a:solidFill>
+                <a:schemeClr val="bg1"/>
+              </a:solidFill>
+            </p:spPr>
+            <p:txBody>
+              <a:bodyPr wrap="square" lIns="0" tIns="0" rIns="0" bIns="0" rtlCol="0">
+                <a:spAutoFit/>
+              </a:bodyPr>
+              <a:lstStyle/>
+              <a:p>
+                <a:pPr/>
+                <a14:m>
+                  <m:oMathPara xmlns:m="http://schemas.openxmlformats.org/officeDocument/2006/math">
+                    <m:oMathParaPr>
+                      <m:jc m:val="center"/>
+                    </m:oMathParaPr>
+                    <m:oMath xmlns:m="http://schemas.openxmlformats.org/officeDocument/2006/math">
+                      <m:r>
+                        <a:rPr lang="en-NZ" sz="1100" b="1" i="1" smtClean="0">
+                          <a:latin typeface="Cambria Math" panose="02040503050406030204" pitchFamily="18" charset="0"/>
+                        </a:rPr>
+                        <m:t>𝑰</m:t>
+                      </m:r>
+                    </m:oMath>
+                  </m:oMathPara>
+                </a14:m>
+                <a:endParaRPr lang="en-NZ" sz="1100" b="1" dirty="0"/>
+              </a:p>
+            </p:txBody>
+          </p:sp>
+        </mc:Choice>
+        <mc:Fallback>
+          <p:sp>
+            <p:nvSpPr>
+              <p:cNvPr id="64" name="TextBox 63">
+                <a:extLst>
+                  <a:ext uri="{FF2B5EF4-FFF2-40B4-BE49-F238E27FC236}">
+                    <a16:creationId xmlns:a16="http://schemas.microsoft.com/office/drawing/2014/main" id="{8E17F605-18C2-4FE0-8FDF-E98A06207729}"/>
+                  </a:ext>
+                </a:extLst>
+              </p:cNvPr>
+              <p:cNvSpPr txBox="1">
+                <a:spLocks noRot="1" noChangeAspect="1" noMove="1" noResize="1" noEditPoints="1" noAdjustHandles="1" noChangeArrowheads="1" noChangeShapeType="1" noTextEdit="1"/>
+              </p:cNvSpPr>
+              <p:nvPr/>
+            </p:nvSpPr>
+            <p:spPr>
+              <a:xfrm>
+                <a:off x="1849714" y="8165070"/>
+                <a:ext cx="469920" cy="169277"/>
+              </a:xfrm>
+              <a:prstGeom prst="rect">
+                <a:avLst/>
+              </a:prstGeom>
+              <a:blipFill>
+                <a:blip r:embed="rId29"/>
+                <a:stretch>
+                  <a:fillRect b="-7143"/>
+                </a:stretch>
+              </a:blipFill>
+            </p:spPr>
+            <p:txBody>
+              <a:bodyPr/>
+              <a:lstStyle/>
+              <a:p>
+                <a:r>
+                  <a:rPr lang="en-NZ">
+                    <a:noFill/>
+                  </a:rPr>
+                  <a:t> </a:t>
+                </a:r>
+              </a:p>
+            </p:txBody>
+          </p:sp>
+        </mc:Fallback>
+      </mc:AlternateContent>
     </p:spTree>
     <p:extLst>
       <p:ext uri="{BB962C8B-B14F-4D97-AF65-F5344CB8AC3E}">

</xml_diff>